<commit_message>
test diff s3 sync
add, modify and delete a slide
</commit_message>
<xml_diff>
--- a/database/slides/AS_I_KNEEL_BEFORE_YOU.pptx
+++ b/database/slides/AS_I_KNEEL_BEFORE_YOU.pptx
@@ -757,7 +757,11 @@
             </a:pPr>
             <a:r>
               <a:rPr lang="en-US" dirty="0"/>
-              <a:t>RECEIPPT-TAGS:MARY</a:t>
+              <a:t>RECEIPPT-TAGS</a:t>
+            </a:r>
+            <a:r>
+              <a:rPr lang="en-US"/>
+              <a:t>:MARY,ENTRANCE</a:t>
             </a:r>
             <a:endParaRPr dirty="0"/>
           </a:p>

</xml_diff>